<commit_message>
Update the Power Point after Zoom
</commit_message>
<xml_diff>
--- a/Breweries In USA.pptx
+++ b/Breweries In USA.pptx
@@ -5,19 +5,20 @@
     <p:sldMasterId id="2147483648" r:id="rId1"/>
   </p:sldMasterIdLst>
   <p:notesMasterIdLst>
-    <p:notesMasterId r:id="rId12"/>
+    <p:notesMasterId r:id="rId13"/>
   </p:notesMasterIdLst>
   <p:sldIdLst>
     <p:sldId id="256" r:id="rId2"/>
     <p:sldId id="257" r:id="rId3"/>
-    <p:sldId id="264" r:id="rId4"/>
+    <p:sldId id="266" r:id="rId4"/>
     <p:sldId id="258" r:id="rId5"/>
     <p:sldId id="263" r:id="rId6"/>
     <p:sldId id="259" r:id="rId7"/>
     <p:sldId id="265" r:id="rId8"/>
-    <p:sldId id="260" r:id="rId9"/>
-    <p:sldId id="261" r:id="rId10"/>
+    <p:sldId id="261" r:id="rId9"/>
+    <p:sldId id="267" r:id="rId10"/>
     <p:sldId id="262" r:id="rId11"/>
+    <p:sldId id="269" r:id="rId12"/>
   </p:sldIdLst>
   <p:sldSz cx="12192000" cy="6858000"/>
   <p:notesSz cx="6858000" cy="9144000"/>
@@ -622,7 +623,7 @@
           <a:p>
             <a:fld id="{BECBDD10-B7B8-49EB-8344-BE02F389E16A}" type="slidenum">
               <a:rPr lang="en-US" smtClean="0"/>
-              <a:t>9</a:t>
+              <a:t>8</a:t>
             </a:fld>
             <a:endParaRPr lang="en-US"/>
           </a:p>
@@ -632,6 +633,90 @@
     <p:extLst>
       <p:ext uri="{BB962C8B-B14F-4D97-AF65-F5344CB8AC3E}">
         <p14:creationId xmlns:p14="http://schemas.microsoft.com/office/powerpoint/2010/main" val="2922067607"/>
+      </p:ext>
+    </p:extLst>
+  </p:cSld>
+  <p:clrMapOvr>
+    <a:masterClrMapping/>
+  </p:clrMapOvr>
+</p:notes>
+</file>
+
+<file path=ppt/notesSlides/notesSlide3.xml><?xml version="1.0" encoding="utf-8"?>
+<p:notes xmlns:a="http://schemas.openxmlformats.org/drawingml/2006/main" xmlns:r="http://schemas.openxmlformats.org/officeDocument/2006/relationships" xmlns:p="http://schemas.openxmlformats.org/presentationml/2006/main">
+  <p:cSld>
+    <p:spTree>
+      <p:nvGrpSpPr>
+        <p:cNvPr id="1" name=""/>
+        <p:cNvGrpSpPr/>
+        <p:nvPr/>
+      </p:nvGrpSpPr>
+      <p:grpSpPr>
+        <a:xfrm>
+          <a:off x="0" y="0"/>
+          <a:ext cx="0" cy="0"/>
+          <a:chOff x="0" y="0"/>
+          <a:chExt cx="0" cy="0"/>
+        </a:xfrm>
+      </p:grpSpPr>
+      <p:sp>
+        <p:nvSpPr>
+          <p:cNvPr id="2" name="Slide Image Placeholder 1"/>
+          <p:cNvSpPr>
+            <a:spLocks noGrp="1" noRot="1" noChangeAspect="1"/>
+          </p:cNvSpPr>
+          <p:nvPr>
+            <p:ph type="sldImg"/>
+          </p:nvPr>
+        </p:nvSpPr>
+        <p:spPr/>
+      </p:sp>
+      <p:sp>
+        <p:nvSpPr>
+          <p:cNvPr id="3" name="Notes Placeholder 2"/>
+          <p:cNvSpPr>
+            <a:spLocks noGrp="1"/>
+          </p:cNvSpPr>
+          <p:nvPr>
+            <p:ph type="body" idx="1"/>
+          </p:nvPr>
+        </p:nvSpPr>
+        <p:spPr/>
+        <p:txBody>
+          <a:bodyPr/>
+          <a:lstStyle/>
+          <a:p>
+            <a:endParaRPr lang="en-US" dirty="0"/>
+          </a:p>
+        </p:txBody>
+      </p:sp>
+      <p:sp>
+        <p:nvSpPr>
+          <p:cNvPr id="4" name="Slide Number Placeholder 3"/>
+          <p:cNvSpPr>
+            <a:spLocks noGrp="1"/>
+          </p:cNvSpPr>
+          <p:nvPr>
+            <p:ph type="sldNum" sz="quarter" idx="5"/>
+          </p:nvPr>
+        </p:nvSpPr>
+        <p:spPr/>
+        <p:txBody>
+          <a:bodyPr/>
+          <a:lstStyle/>
+          <a:p>
+            <a:fld id="{BECBDD10-B7B8-49EB-8344-BE02F389E16A}" type="slidenum">
+              <a:rPr lang="en-US" smtClean="0"/>
+              <a:t>9</a:t>
+            </a:fld>
+            <a:endParaRPr lang="en-US"/>
+          </a:p>
+        </p:txBody>
+      </p:sp>
+    </p:spTree>
+    <p:extLst>
+      <p:ext uri="{BB962C8B-B14F-4D97-AF65-F5344CB8AC3E}">
+        <p14:creationId xmlns:p14="http://schemas.microsoft.com/office/powerpoint/2010/main" val="3915985534"/>
       </p:ext>
     </p:extLst>
   </p:cSld>
@@ -4033,8 +4118,8 @@
         </p:nvSpPr>
         <p:spPr>
           <a:xfrm>
-            <a:off x="615820" y="892314"/>
-            <a:ext cx="4749281" cy="707886"/>
+            <a:off x="3350393" y="1746080"/>
+            <a:ext cx="6388830" cy="2554545"/>
           </a:xfrm>
           <a:prstGeom prst="rect">
             <a:avLst/>
@@ -4048,100 +4133,12 @@
           <a:lstStyle/>
           <a:p>
             <a:r>
-              <a:rPr lang="en-US" sz="4000" dirty="0">
+              <a:rPr lang="en-US" sz="8000" dirty="0">
                 <a:solidFill>
                   <a:schemeClr val="bg1"/>
                 </a:solidFill>
               </a:rPr>
               <a:t>Breweries In the USA</a:t>
-            </a:r>
-          </a:p>
-        </p:txBody>
-      </p:sp>
-      <p:sp>
-        <p:nvSpPr>
-          <p:cNvPr id="8" name="Rectangle 7">
-            <a:extLst>
-              <a:ext uri="{FF2B5EF4-FFF2-40B4-BE49-F238E27FC236}">
-                <a16:creationId xmlns:a16="http://schemas.microsoft.com/office/drawing/2014/main" id="{4074B6B6-D911-79E2-39C9-BD1C9C25CCE5}"/>
-              </a:ext>
-            </a:extLst>
-          </p:cNvPr>
-          <p:cNvSpPr/>
-          <p:nvPr/>
-        </p:nvSpPr>
-        <p:spPr>
-          <a:xfrm>
-            <a:off x="755780" y="1600200"/>
-            <a:ext cx="4609321" cy="230049"/>
-          </a:xfrm>
-          <a:prstGeom prst="rect">
-            <a:avLst/>
-          </a:prstGeom>
-          <a:solidFill>
-            <a:srgbClr val="B49564"/>
-          </a:solidFill>
-        </p:spPr>
-        <p:style>
-          <a:lnRef idx="2">
-            <a:schemeClr val="accent1">
-              <a:shade val="15000"/>
-            </a:schemeClr>
-          </a:lnRef>
-          <a:fillRef idx="1">
-            <a:schemeClr val="accent1"/>
-          </a:fillRef>
-          <a:effectRef idx="0">
-            <a:schemeClr val="accent1"/>
-          </a:effectRef>
-          <a:fontRef idx="minor">
-            <a:schemeClr val="lt1"/>
-          </a:fontRef>
-        </p:style>
-        <p:txBody>
-          <a:bodyPr rtlCol="0" anchor="ctr"/>
-          <a:lstStyle/>
-          <a:p>
-            <a:pPr algn="ctr"/>
-            <a:endParaRPr lang="en-US" dirty="0"/>
-          </a:p>
-        </p:txBody>
-      </p:sp>
-      <p:sp>
-        <p:nvSpPr>
-          <p:cNvPr id="9" name="TextBox 8">
-            <a:extLst>
-              <a:ext uri="{FF2B5EF4-FFF2-40B4-BE49-F238E27FC236}">
-                <a16:creationId xmlns:a16="http://schemas.microsoft.com/office/drawing/2014/main" id="{A37E31AE-90C2-1050-CDB6-ED4289B46EA3}"/>
-              </a:ext>
-            </a:extLst>
-          </p:cNvPr>
-          <p:cNvSpPr txBox="1"/>
-          <p:nvPr/>
-        </p:nvSpPr>
-        <p:spPr>
-          <a:xfrm>
-            <a:off x="755779" y="2778124"/>
-            <a:ext cx="3834881" cy="369332"/>
-          </a:xfrm>
-          <a:prstGeom prst="rect">
-            <a:avLst/>
-          </a:prstGeom>
-          <a:noFill/>
-        </p:spPr>
-        <p:txBody>
-          <a:bodyPr wrap="square" rtlCol="0">
-            <a:spAutoFit/>
-          </a:bodyPr>
-          <a:lstStyle/>
-          <a:p>
-            <a:r>
-              <a:rPr lang="en-US" dirty="0">
-                <a:solidFill>
-                  <a:schemeClr val="bg1"/>
-                </a:solidFill>
-              </a:rPr>
-              <a:t>Brief Description of our Project</a:t>
             </a:r>
           </a:p>
         </p:txBody>
@@ -4355,7 +4352,7 @@
         </p:blipFill>
         <p:spPr>
           <a:xfrm>
-            <a:off x="7881676" y="1439066"/>
+            <a:off x="7693698" y="1590602"/>
             <a:ext cx="4550970" cy="3979868"/>
           </a:xfrm>
           <a:prstGeom prst="rect">
@@ -4378,7 +4375,7 @@
         <p:spPr>
           <a:xfrm>
             <a:off x="-74646" y="267163"/>
-            <a:ext cx="4749281" cy="1938992"/>
+            <a:ext cx="5198737" cy="1323439"/>
           </a:xfrm>
           <a:prstGeom prst="rect">
             <a:avLst/>
@@ -4398,7 +4395,7 @@
                   <a:schemeClr val="bg1"/>
                 </a:solidFill>
               </a:rPr>
-              <a:t>State Population to Number of Breweries</a:t>
+              <a:t>Population to Breweries Correlation</a:t>
             </a:r>
           </a:p>
         </p:txBody>
@@ -4474,8 +4471,8 @@
         </p:blipFill>
         <p:spPr>
           <a:xfrm>
-            <a:off x="4424129" y="925443"/>
-            <a:ext cx="3343742" cy="5582429"/>
+            <a:off x="4702625" y="1590602"/>
+            <a:ext cx="2947387" cy="4920709"/>
           </a:xfrm>
           <a:prstGeom prst="rect">
             <a:avLst/>
@@ -4486,6 +4483,233 @@
     <p:extLst>
       <p:ext uri="{BB962C8B-B14F-4D97-AF65-F5344CB8AC3E}">
         <p14:creationId xmlns:p14="http://schemas.microsoft.com/office/powerpoint/2010/main" val="2023366773"/>
+      </p:ext>
+    </p:extLst>
+  </p:cSld>
+  <p:clrMapOvr>
+    <a:masterClrMapping/>
+  </p:clrMapOvr>
+</p:sld>
+</file>
+
+<file path=ppt/slides/slide11.xml><?xml version="1.0" encoding="utf-8"?>
+<p:sld xmlns:a="http://schemas.openxmlformats.org/drawingml/2006/main" xmlns:r="http://schemas.openxmlformats.org/officeDocument/2006/relationships" xmlns:p="http://schemas.openxmlformats.org/presentationml/2006/main">
+  <p:cSld>
+    <p:bg>
+      <p:bgPr>
+        <a:solidFill>
+          <a:schemeClr val="tx1"/>
+        </a:solidFill>
+        <a:effectLst/>
+      </p:bgPr>
+    </p:bg>
+    <p:spTree>
+      <p:nvGrpSpPr>
+        <p:cNvPr id="1" name=""/>
+        <p:cNvGrpSpPr/>
+        <p:nvPr/>
+      </p:nvGrpSpPr>
+      <p:grpSpPr>
+        <a:xfrm>
+          <a:off x="0" y="0"/>
+          <a:ext cx="0" cy="0"/>
+          <a:chOff x="0" y="0"/>
+          <a:chExt cx="0" cy="0"/>
+        </a:xfrm>
+      </p:grpSpPr>
+      <p:sp>
+        <p:nvSpPr>
+          <p:cNvPr id="6" name="Rectangle 5">
+            <a:extLst>
+              <a:ext uri="{FF2B5EF4-FFF2-40B4-BE49-F238E27FC236}">
+                <a16:creationId xmlns:a16="http://schemas.microsoft.com/office/drawing/2014/main" id="{D1F19900-DFAF-128C-9B30-82AA1F4CE407}"/>
+              </a:ext>
+            </a:extLst>
+          </p:cNvPr>
+          <p:cNvSpPr/>
+          <p:nvPr/>
+        </p:nvSpPr>
+        <p:spPr>
+          <a:xfrm>
+            <a:off x="-102638" y="0"/>
+            <a:ext cx="8182948" cy="6858000"/>
+          </a:xfrm>
+          <a:prstGeom prst="rect">
+            <a:avLst/>
+          </a:prstGeom>
+          <a:gradFill>
+            <a:gsLst>
+              <a:gs pos="77000">
+                <a:srgbClr val="808080">
+                  <a:alpha val="35000"/>
+                </a:srgbClr>
+              </a:gs>
+              <a:gs pos="61000">
+                <a:schemeClr val="tx1"/>
+              </a:gs>
+              <a:gs pos="100000">
+                <a:schemeClr val="bg1">
+                  <a:alpha val="0"/>
+                </a:schemeClr>
+              </a:gs>
+            </a:gsLst>
+            <a:lin ang="0" scaled="0"/>
+          </a:gradFill>
+          <a:ln>
+            <a:noFill/>
+          </a:ln>
+        </p:spPr>
+        <p:style>
+          <a:lnRef idx="2">
+            <a:schemeClr val="dk1">
+              <a:shade val="15000"/>
+            </a:schemeClr>
+          </a:lnRef>
+          <a:fillRef idx="1">
+            <a:schemeClr val="dk1"/>
+          </a:fillRef>
+          <a:effectRef idx="0">
+            <a:schemeClr val="dk1"/>
+          </a:effectRef>
+          <a:fontRef idx="minor">
+            <a:schemeClr val="lt1"/>
+          </a:fontRef>
+        </p:style>
+        <p:txBody>
+          <a:bodyPr rtlCol="0" anchor="ctr"/>
+          <a:lstStyle/>
+          <a:p>
+            <a:pPr algn="ctr"/>
+            <a:endParaRPr lang="en-US" dirty="0"/>
+          </a:p>
+        </p:txBody>
+      </p:sp>
+      <p:pic>
+        <p:nvPicPr>
+          <p:cNvPr id="5" name="Picture 4" descr="A close-up of a crack in a window&#10;&#10;Description automatically generated">
+            <a:extLst>
+              <a:ext uri="{FF2B5EF4-FFF2-40B4-BE49-F238E27FC236}">
+                <a16:creationId xmlns:a16="http://schemas.microsoft.com/office/drawing/2014/main" id="{32F6773C-25C7-D253-54D9-C4390FC79914}"/>
+              </a:ext>
+            </a:extLst>
+          </p:cNvPr>
+          <p:cNvPicPr>
+            <a:picLocks noChangeAspect="1"/>
+          </p:cNvPicPr>
+          <p:nvPr/>
+        </p:nvPicPr>
+        <p:blipFill>
+          <a:blip r:embed="rId2">
+            <a:extLst>
+              <a:ext uri="{28A0092B-C50C-407E-A947-70E740481C1C}">
+                <a14:useLocalDpi xmlns:a14="http://schemas.microsoft.com/office/drawing/2010/main" val="0"/>
+              </a:ext>
+            </a:extLst>
+          </a:blip>
+          <a:stretch>
+            <a:fillRect/>
+          </a:stretch>
+        </p:blipFill>
+        <p:spPr>
+          <a:xfrm>
+            <a:off x="-163902" y="0"/>
+            <a:ext cx="12355902" cy="6858000"/>
+          </a:xfrm>
+          <a:prstGeom prst="rect">
+            <a:avLst/>
+          </a:prstGeom>
+        </p:spPr>
+      </p:pic>
+      <p:sp>
+        <p:nvSpPr>
+          <p:cNvPr id="2" name="TextBox 1">
+            <a:extLst>
+              <a:ext uri="{FF2B5EF4-FFF2-40B4-BE49-F238E27FC236}">
+                <a16:creationId xmlns:a16="http://schemas.microsoft.com/office/drawing/2014/main" id="{69B4999B-8842-7ABD-1D13-0A065AF8F2CA}"/>
+              </a:ext>
+            </a:extLst>
+          </p:cNvPr>
+          <p:cNvSpPr txBox="1"/>
+          <p:nvPr/>
+        </p:nvSpPr>
+        <p:spPr>
+          <a:xfrm>
+            <a:off x="1874924" y="275790"/>
+            <a:ext cx="7847046" cy="707886"/>
+          </a:xfrm>
+          <a:prstGeom prst="rect">
+            <a:avLst/>
+          </a:prstGeom>
+          <a:noFill/>
+        </p:spPr>
+        <p:txBody>
+          <a:bodyPr wrap="square" rtlCol="0">
+            <a:spAutoFit/>
+          </a:bodyPr>
+          <a:lstStyle/>
+          <a:p>
+            <a:pPr algn="ctr"/>
+            <a:r>
+              <a:rPr lang="en-US" sz="4000" dirty="0">
+                <a:solidFill>
+                  <a:schemeClr val="bg1"/>
+                </a:solidFill>
+              </a:rPr>
+              <a:t>Issues That Came up</a:t>
+            </a:r>
+          </a:p>
+        </p:txBody>
+      </p:sp>
+      <p:sp>
+        <p:nvSpPr>
+          <p:cNvPr id="3" name="TextBox 2">
+            <a:extLst>
+              <a:ext uri="{FF2B5EF4-FFF2-40B4-BE49-F238E27FC236}">
+                <a16:creationId xmlns:a16="http://schemas.microsoft.com/office/drawing/2014/main" id="{D10ADEA9-8BC7-86D5-C113-5100EF16128B}"/>
+              </a:ext>
+            </a:extLst>
+          </p:cNvPr>
+          <p:cNvSpPr txBox="1"/>
+          <p:nvPr/>
+        </p:nvSpPr>
+        <p:spPr>
+          <a:xfrm>
+            <a:off x="279702" y="1654062"/>
+            <a:ext cx="4342823" cy="646331"/>
+          </a:xfrm>
+          <a:prstGeom prst="rect">
+            <a:avLst/>
+          </a:prstGeom>
+          <a:noFill/>
+        </p:spPr>
+        <p:txBody>
+          <a:bodyPr wrap="square" rtlCol="0">
+            <a:spAutoFit/>
+          </a:bodyPr>
+          <a:lstStyle/>
+          <a:p>
+            <a:r>
+              <a:rPr lang="en-US" dirty="0">
+                <a:solidFill>
+                  <a:schemeClr val="bg1"/>
+                </a:solidFill>
+              </a:rPr>
+              <a:t>Issue 1</a:t>
+            </a:r>
+          </a:p>
+          <a:p>
+            <a:endParaRPr lang="en-US" dirty="0">
+              <a:solidFill>
+                <a:schemeClr val="bg1"/>
+              </a:solidFill>
+            </a:endParaRPr>
+          </a:p>
+        </p:txBody>
+      </p:sp>
+    </p:spTree>
+    <p:extLst>
+      <p:ext uri="{BB962C8B-B14F-4D97-AF65-F5344CB8AC3E}">
+        <p14:creationId xmlns:p14="http://schemas.microsoft.com/office/powerpoint/2010/main" val="3623992370"/>
       </p:ext>
     </p:extLst>
   </p:cSld>
@@ -4534,8 +4758,8 @@
         </p:nvSpPr>
         <p:spPr>
           <a:xfrm>
-            <a:off x="4604654" y="0"/>
-            <a:ext cx="7469158" cy="2400657"/>
+            <a:off x="4604654" y="433990"/>
+            <a:ext cx="7469158" cy="1477328"/>
           </a:xfrm>
           <a:prstGeom prst="rect">
             <a:avLst/>
@@ -4579,16 +4803,6 @@
                 <a:schemeClr val="bg1"/>
               </a:solidFill>
             </a:endParaRPr>
-          </a:p>
-          <a:p>
-            <a:r>
-              <a:rPr lang="en-US" sz="1500" dirty="0">
-                <a:solidFill>
-                  <a:schemeClr val="bg1"/>
-                </a:solidFill>
-              </a:rPr>
-              <a:t>When the data was mapped, it appears that majority of the breweries are near a body of water. Either being on a coast or near a large lake body. Import/Exports would have been the next step to look for and compare with ports and brewery locations, but unable to find necessary data in timeframe.</a:t>
-            </a:r>
           </a:p>
         </p:txBody>
       </p:sp>
@@ -4757,10 +4971,10 @@
       </p:grpSpPr>
       <p:sp>
         <p:nvSpPr>
-          <p:cNvPr id="18" name="TextBox 17">
-            <a:extLst>
-              <a:ext uri="{FF2B5EF4-FFF2-40B4-BE49-F238E27FC236}">
-                <a16:creationId xmlns:a16="http://schemas.microsoft.com/office/drawing/2014/main" id="{9276DD67-3442-A801-02B3-56B8374CD102}"/>
+          <p:cNvPr id="19" name="TextBox 18">
+            <a:extLst>
+              <a:ext uri="{FF2B5EF4-FFF2-40B4-BE49-F238E27FC236}">
+                <a16:creationId xmlns:a16="http://schemas.microsoft.com/office/drawing/2014/main" id="{71D2E4CB-C139-5261-AAAE-FB898C2C9AB6}"/>
               </a:ext>
             </a:extLst>
           </p:cNvPr>
@@ -4769,46 +4983,7 @@
         </p:nvSpPr>
         <p:spPr>
           <a:xfrm>
-            <a:off x="6015347" y="201423"/>
-            <a:ext cx="4427203" cy="1077218"/>
-          </a:xfrm>
-          <a:prstGeom prst="rect">
-            <a:avLst/>
-          </a:prstGeom>
-          <a:noFill/>
-        </p:spPr>
-        <p:txBody>
-          <a:bodyPr wrap="square" rtlCol="0">
-            <a:spAutoFit/>
-          </a:bodyPr>
-          <a:lstStyle/>
-          <a:p>
-            <a:r>
-              <a:rPr lang="en-US" sz="1600" dirty="0">
-                <a:solidFill>
-                  <a:schemeClr val="bg1"/>
-                </a:solidFill>
-              </a:rPr>
-              <a:t>Right off the bat, we can see that there is going to be an outlier in California. The # of breweries is drastically higher than almost all of the other states equaling 4, even 5 times the amount. </a:t>
-            </a:r>
-          </a:p>
-        </p:txBody>
-      </p:sp>
-      <p:sp>
-        <p:nvSpPr>
-          <p:cNvPr id="19" name="TextBox 18">
-            <a:extLst>
-              <a:ext uri="{FF2B5EF4-FFF2-40B4-BE49-F238E27FC236}">
-                <a16:creationId xmlns:a16="http://schemas.microsoft.com/office/drawing/2014/main" id="{71D2E4CB-C139-5261-AAAE-FB898C2C9AB6}"/>
-              </a:ext>
-            </a:extLst>
-          </p:cNvPr>
-          <p:cNvSpPr txBox="1"/>
-          <p:nvPr/>
-        </p:nvSpPr>
-        <p:spPr>
-          <a:xfrm>
-            <a:off x="-144627" y="78313"/>
+            <a:off x="74666" y="101549"/>
             <a:ext cx="4749281" cy="1323439"/>
           </a:xfrm>
           <a:prstGeom prst="rect">
@@ -4848,7 +5023,7 @@
         </p:nvSpPr>
         <p:spPr>
           <a:xfrm>
-            <a:off x="-74646" y="1742740"/>
+            <a:off x="144645" y="1345994"/>
             <a:ext cx="4609321" cy="230049"/>
           </a:xfrm>
           <a:prstGeom prst="rect">
@@ -4885,10 +5060,10 @@
       </p:sp>
       <p:pic>
         <p:nvPicPr>
-          <p:cNvPr id="11" name="Picture 10" descr="A graph with blue and black text&#10;&#10;Description automatically generated">
-            <a:extLst>
-              <a:ext uri="{FF2B5EF4-FFF2-40B4-BE49-F238E27FC236}">
-                <a16:creationId xmlns:a16="http://schemas.microsoft.com/office/drawing/2014/main" id="{D6AA60FB-26E9-5BF9-D54B-63225A948ADF}"/>
+          <p:cNvPr id="3" name="Picture 2">
+            <a:extLst>
+              <a:ext uri="{FF2B5EF4-FFF2-40B4-BE49-F238E27FC236}">
+                <a16:creationId xmlns:a16="http://schemas.microsoft.com/office/drawing/2014/main" id="{0828BF30-EA6F-41D4-D07F-75F330D5D0DB}"/>
               </a:ext>
             </a:extLst>
           </p:cNvPr>
@@ -4898,21 +5073,84 @@
           <p:nvPr/>
         </p:nvPicPr>
         <p:blipFill>
-          <a:blip r:embed="rId2">
-            <a:extLst>
-              <a:ext uri="{28A0092B-C50C-407E-A947-70E740481C1C}">
-                <a14:useLocalDpi xmlns:a14="http://schemas.microsoft.com/office/drawing/2010/main" val="0"/>
-              </a:ext>
-            </a:extLst>
-          </a:blip>
+          <a:blip r:embed="rId2"/>
           <a:stretch>
             <a:fillRect/>
           </a:stretch>
         </p:blipFill>
         <p:spPr>
           <a:xfrm>
-            <a:off x="559836" y="2420883"/>
-            <a:ext cx="11202955" cy="4358804"/>
+            <a:off x="2449307" y="1660108"/>
+            <a:ext cx="6399544" cy="5128206"/>
+          </a:xfrm>
+          <a:prstGeom prst="rect">
+            <a:avLst/>
+          </a:prstGeom>
+        </p:spPr>
+      </p:pic>
+      <p:sp>
+        <p:nvSpPr>
+          <p:cNvPr id="5" name="TextBox 4">
+            <a:extLst>
+              <a:ext uri="{FF2B5EF4-FFF2-40B4-BE49-F238E27FC236}">
+                <a16:creationId xmlns:a16="http://schemas.microsoft.com/office/drawing/2014/main" id="{2F3C6D04-4AD2-0231-BCBB-B9C7EE5D7FDB}"/>
+              </a:ext>
+            </a:extLst>
+          </p:cNvPr>
+          <p:cNvSpPr txBox="1"/>
+          <p:nvPr/>
+        </p:nvSpPr>
+        <p:spPr>
+          <a:xfrm>
+            <a:off x="4949711" y="184710"/>
+            <a:ext cx="7489580" cy="1077218"/>
+          </a:xfrm>
+          <a:prstGeom prst="rect">
+            <a:avLst/>
+          </a:prstGeom>
+          <a:noFill/>
+        </p:spPr>
+        <p:txBody>
+          <a:bodyPr wrap="square">
+            <a:spAutoFit/>
+          </a:bodyPr>
+          <a:lstStyle/>
+          <a:p>
+            <a:r>
+              <a:rPr lang="en-US" sz="1600" dirty="0">
+                <a:solidFill>
+                  <a:schemeClr val="bg1"/>
+                </a:solidFill>
+              </a:rPr>
+              <a:t>When the data was mapped, it appears that majority of the breweries are near a body of water. Either being on a coast or near a large lake body. Import/Exports would have been the next step to look for and compare with ports and brewery locations, but unable to find necessary data in timeframe.</a:t>
+            </a:r>
+          </a:p>
+        </p:txBody>
+      </p:sp>
+      <p:pic>
+        <p:nvPicPr>
+          <p:cNvPr id="8" name="Picture 7">
+            <a:extLst>
+              <a:ext uri="{FF2B5EF4-FFF2-40B4-BE49-F238E27FC236}">
+                <a16:creationId xmlns:a16="http://schemas.microsoft.com/office/drawing/2014/main" id="{6F279230-3236-8018-E811-9ABD82AC9442}"/>
+              </a:ext>
+            </a:extLst>
+          </p:cNvPr>
+          <p:cNvPicPr>
+            <a:picLocks noChangeAspect="1"/>
+          </p:cNvPicPr>
+          <p:nvPr/>
+        </p:nvPicPr>
+        <p:blipFill>
+          <a:blip r:embed="rId3"/>
+          <a:stretch>
+            <a:fillRect/>
+          </a:stretch>
+        </p:blipFill>
+        <p:spPr>
+          <a:xfrm>
+            <a:off x="8621736" y="1639018"/>
+            <a:ext cx="988089" cy="5162264"/>
           </a:xfrm>
           <a:prstGeom prst="rect">
             <a:avLst/>
@@ -4922,7 +5160,7 @@
     </p:spTree>
     <p:extLst>
       <p:ext uri="{BB962C8B-B14F-4D97-AF65-F5344CB8AC3E}">
-        <p14:creationId xmlns:p14="http://schemas.microsoft.com/office/powerpoint/2010/main" val="1857902207"/>
+        <p14:creationId xmlns:p14="http://schemas.microsoft.com/office/powerpoint/2010/main" val="4250044223"/>
       </p:ext>
     </p:extLst>
   </p:cSld>
@@ -5067,7 +5305,7 @@
         <p:spPr>
           <a:xfrm>
             <a:off x="77265" y="2822344"/>
-            <a:ext cx="4445458" cy="1754326"/>
+            <a:ext cx="4445458" cy="2800767"/>
           </a:xfrm>
           <a:prstGeom prst="rect">
             <a:avLst/>
@@ -5080,7 +5318,17 @@
           </a:bodyPr>
           <a:lstStyle/>
           <a:p>
-            <a:endParaRPr lang="en-US" dirty="0">
+            <a:r>
+              <a:rPr lang="en-US" sz="1600" dirty="0">
+                <a:solidFill>
+                  <a:schemeClr val="bg1"/>
+                </a:solidFill>
+              </a:rPr>
+              <a:t>Generating a basic scatter plot, we can see that our plot is pretty bundled together indicating little to no correlation. Plotting our line and printing our R Value, the scatter plot has an actual negative correlation between our two values, sitting at -.24. </a:t>
+            </a:r>
+          </a:p>
+          <a:p>
+            <a:endParaRPr lang="en-US" sz="1600" dirty="0">
               <a:solidFill>
                 <a:schemeClr val="bg1"/>
               </a:solidFill>
@@ -5088,12 +5336,12 @@
           </a:p>
           <a:p>
             <a:r>
-              <a:rPr lang="en-US" dirty="0">
+              <a:rPr lang="en-US" sz="1600" dirty="0">
                 <a:solidFill>
                   <a:schemeClr val="bg1"/>
                 </a:solidFill>
               </a:rPr>
-              <a:t>While alcohol consumed by state is a little closer together. Although, a number of our highest producing states of breweries have actually some of the lowest #s of alcohol consumed when comparing inside our DF.</a:t>
+              <a:t>This means the states with most breweries are states that are drinking the least. This at the very least indicates that the # of Breweries Per State is driven by a separate factor.</a:t>
             </a:r>
           </a:p>
         </p:txBody>
@@ -5467,14 +5715,182 @@
         </p:blipFill>
         <p:spPr>
           <a:xfrm>
-            <a:off x="3146389" y="1875725"/>
-            <a:ext cx="5618273" cy="4109822"/>
+            <a:off x="5597340" y="1880559"/>
+            <a:ext cx="6255110" cy="4575674"/>
           </a:xfrm>
           <a:prstGeom prst="rect">
             <a:avLst/>
           </a:prstGeom>
         </p:spPr>
       </p:pic>
+      <p:sp>
+        <p:nvSpPr>
+          <p:cNvPr id="3" name="TextBox 2">
+            <a:extLst>
+              <a:ext uri="{FF2B5EF4-FFF2-40B4-BE49-F238E27FC236}">
+                <a16:creationId xmlns:a16="http://schemas.microsoft.com/office/drawing/2014/main" id="{C593F109-551F-35A9-E250-FF467CF797DC}"/>
+              </a:ext>
+            </a:extLst>
+          </p:cNvPr>
+          <p:cNvSpPr txBox="1"/>
+          <p:nvPr/>
+        </p:nvSpPr>
+        <p:spPr>
+          <a:xfrm>
+            <a:off x="238545" y="2663593"/>
+            <a:ext cx="4060049" cy="3046988"/>
+          </a:xfrm>
+          <a:prstGeom prst="rect">
+            <a:avLst/>
+          </a:prstGeom>
+          <a:noFill/>
+        </p:spPr>
+        <p:txBody>
+          <a:bodyPr wrap="square">
+            <a:spAutoFit/>
+          </a:bodyPr>
+          <a:lstStyle/>
+          <a:p>
+            <a:r>
+              <a:rPr lang="en-US" sz="1600" b="0" i="0" dirty="0">
+                <a:solidFill>
+                  <a:schemeClr val="bg1"/>
+                </a:solidFill>
+                <a:effectLst/>
+                <a:latin typeface="Arial" panose="020B0604020202020204" pitchFamily="34" charset="0"/>
+              </a:rPr>
+              <a:t>In 2023 the state with the highest beer tax is Tennessee at $1.29 per gallon.</a:t>
+            </a:r>
+            <a:br>
+              <a:rPr lang="en-US" sz="1600" dirty="0">
+                <a:solidFill>
+                  <a:schemeClr val="bg1"/>
+                </a:solidFill>
+              </a:rPr>
+            </a:br>
+            <a:r>
+              <a:rPr lang="en-US" sz="1600" b="0" i="0" dirty="0">
+                <a:solidFill>
+                  <a:schemeClr val="bg1"/>
+                </a:solidFill>
+                <a:effectLst/>
+                <a:latin typeface="Arial" panose="020B0604020202020204" pitchFamily="34" charset="0"/>
+              </a:rPr>
+              <a:t>The state with the lowest beer tax is Wyoming at a rate of $0.02 per gallon.</a:t>
+            </a:r>
+            <a:br>
+              <a:rPr lang="en-US" sz="1600" dirty="0">
+                <a:solidFill>
+                  <a:schemeClr val="bg1"/>
+                </a:solidFill>
+              </a:rPr>
+            </a:br>
+            <a:r>
+              <a:rPr lang="en-US" sz="1600" b="0" i="0" dirty="0">
+                <a:solidFill>
+                  <a:schemeClr val="bg1"/>
+                </a:solidFill>
+                <a:effectLst/>
+                <a:latin typeface="Arial" panose="020B0604020202020204" pitchFamily="34" charset="0"/>
+              </a:rPr>
+              <a:t>Ref: </a:t>
+            </a:r>
+            <a:r>
+              <a:rPr lang="en-US" sz="1600" b="0" i="0" dirty="0">
+                <a:solidFill>
+                  <a:schemeClr val="bg1"/>
+                </a:solidFill>
+                <a:effectLst/>
+                <a:latin typeface="Arial" panose="020B0604020202020204" pitchFamily="34" charset="0"/>
+                <a:hlinkClick r:id="rId4"/>
+              </a:rPr>
+              <a:t>https://taxfoundation.org/</a:t>
+            </a:r>
+            <a:endParaRPr lang="en-US" sz="1600" b="0" i="0" dirty="0">
+              <a:solidFill>
+                <a:schemeClr val="bg1"/>
+              </a:solidFill>
+              <a:effectLst/>
+              <a:latin typeface="Arial" panose="020B0604020202020204" pitchFamily="34" charset="0"/>
+            </a:endParaRPr>
+          </a:p>
+          <a:p>
+            <a:br>
+              <a:rPr lang="en-US" sz="1600" dirty="0">
+                <a:solidFill>
+                  <a:schemeClr val="bg1"/>
+                </a:solidFill>
+              </a:rPr>
+            </a:br>
+            <a:r>
+              <a:rPr lang="en-US" sz="1600" b="0" i="0" dirty="0">
+                <a:solidFill>
+                  <a:schemeClr val="bg1"/>
+                </a:solidFill>
+                <a:effectLst/>
+                <a:latin typeface="Arial" panose="020B0604020202020204" pitchFamily="34" charset="0"/>
+              </a:rPr>
+              <a:t>Beer production is measured in barrels. There are 31 gallons of beer in a barrel.</a:t>
+            </a:r>
+            <a:br>
+              <a:rPr lang="en-US" sz="1600" dirty="0">
+                <a:solidFill>
+                  <a:schemeClr val="bg1"/>
+                </a:solidFill>
+              </a:rPr>
+            </a:br>
+            <a:r>
+              <a:rPr lang="en-US" sz="1600" b="0" i="0" dirty="0">
+                <a:solidFill>
+                  <a:schemeClr val="bg1"/>
+                </a:solidFill>
+                <a:effectLst/>
+                <a:latin typeface="Arial" panose="020B0604020202020204" pitchFamily="34" charset="0"/>
+              </a:rPr>
+              <a:t>An average monkey weighs 22.5 lbs.</a:t>
+            </a:r>
+            <a:br>
+              <a:rPr lang="en-US" sz="1600" dirty="0">
+                <a:solidFill>
+                  <a:schemeClr val="bg1"/>
+                </a:solidFill>
+              </a:rPr>
+            </a:br>
+            <a:r>
+              <a:rPr lang="en-US" sz="1600" b="0" i="0" dirty="0">
+                <a:solidFill>
+                  <a:schemeClr val="bg1"/>
+                </a:solidFill>
+                <a:effectLst/>
+                <a:latin typeface="Arial" panose="020B0604020202020204" pitchFamily="34" charset="0"/>
+              </a:rPr>
+              <a:t>A gallon of beer weighs about 8.34 pounds</a:t>
+            </a:r>
+            <a:br>
+              <a:rPr lang="en-US" sz="1600" dirty="0">
+                <a:solidFill>
+                  <a:schemeClr val="bg1"/>
+                </a:solidFill>
+              </a:rPr>
+            </a:br>
+            <a:r>
+              <a:rPr lang="en-US" sz="1600" b="0" i="0" dirty="0">
+                <a:solidFill>
+                  <a:schemeClr val="bg1"/>
+                </a:solidFill>
+                <a:effectLst/>
+                <a:latin typeface="Arial" panose="020B0604020202020204" pitchFamily="34" charset="0"/>
+              </a:rPr>
+              <a:t>This means you can fit about 11.5 monkeys in a barrel 😊</a:t>
+            </a:r>
+            <a:endParaRPr lang="en-US" sz="1600" dirty="0">
+              <a:solidFill>
+                <a:schemeClr val="bg1"/>
+              </a:solidFill>
+            </a:endParaRPr>
+          </a:p>
+        </p:txBody>
+      </p:sp>
     </p:spTree>
     <p:extLst>
       <p:ext uri="{BB962C8B-B14F-4D97-AF65-F5344CB8AC3E}">
@@ -5622,8 +6038,8 @@
         </p:nvSpPr>
         <p:spPr>
           <a:xfrm>
-            <a:off x="98549" y="3244334"/>
-            <a:ext cx="3107094" cy="369332"/>
+            <a:off x="184813" y="2795760"/>
+            <a:ext cx="4349862" cy="2031325"/>
           </a:xfrm>
           <a:prstGeom prst="rect">
             <a:avLst/>
@@ -5642,7 +6058,7 @@
                   <a:schemeClr val="bg1"/>
                 </a:solidFill>
               </a:rPr>
-              <a:t>Brief Analysis </a:t>
+              <a:t>We had an initial question of average income per state with breweries and if there was a correlation.  After bringing in the income and merging the files, the data was placed onto a scatter plot.  The correlation was a .07 and the graph indicated there was no correlation.</a:t>
             </a:r>
           </a:p>
         </p:txBody>
@@ -6053,8 +6469,8 @@
         </p:nvSpPr>
         <p:spPr>
           <a:xfrm>
-            <a:off x="706592" y="3828296"/>
-            <a:ext cx="4332740" cy="369332"/>
+            <a:off x="0" y="3902790"/>
+            <a:ext cx="5832231" cy="2585323"/>
           </a:xfrm>
           <a:prstGeom prst="rect">
             <a:avLst/>
@@ -6068,12 +6484,79 @@
           <a:lstStyle/>
           <a:p>
             <a:r>
-              <a:rPr lang="en-US" dirty="0">
+              <a:rPr lang="en-US" sz="1800" b="0" i="0" dirty="0">
+                <a:solidFill>
+                  <a:schemeClr val="bg1"/>
+                </a:solidFill>
+                <a:effectLst/>
+                <a:latin typeface="Arial" panose="020B0604020202020204" pitchFamily="34" charset="0"/>
+              </a:rPr>
+              <a:t>Beer taxes are known as an excise tax. This is sometimes referred to as a ‘sin’ tax.</a:t>
+            </a:r>
+            <a:br>
+              <a:rPr lang="en-US" sz="1800" dirty="0">
                 <a:solidFill>
                   <a:schemeClr val="bg1"/>
                 </a:solidFill>
               </a:rPr>
-              <a:t>2022 had the largest consumption.</a:t>
+            </a:br>
+            <a:r>
+              <a:rPr lang="en-US" sz="1800" b="0" i="0" dirty="0">
+                <a:solidFill>
+                  <a:schemeClr val="bg1"/>
+                </a:solidFill>
+                <a:effectLst/>
+                <a:latin typeface="Arial" panose="020B0604020202020204" pitchFamily="34" charset="0"/>
+              </a:rPr>
+              <a:t>Each state has its own set of rules for excise taxes.</a:t>
+            </a:r>
+          </a:p>
+          <a:p>
+            <a:br>
+              <a:rPr lang="en-US" sz="1800" dirty="0">
+                <a:solidFill>
+                  <a:schemeClr val="bg1"/>
+                </a:solidFill>
+              </a:rPr>
+            </a:br>
+            <a:r>
+              <a:rPr lang="en-US" sz="1800" b="0" i="0" dirty="0">
+                <a:solidFill>
+                  <a:schemeClr val="bg1"/>
+                </a:solidFill>
+                <a:effectLst/>
+                <a:latin typeface="Arial" panose="020B0604020202020204" pitchFamily="34" charset="0"/>
+              </a:rPr>
+              <a:t>Most states have only an excise tax, but some states also include an Ad Valorem </a:t>
+            </a:r>
+          </a:p>
+          <a:p>
+            <a:r>
+              <a:rPr lang="en-US" sz="1800" b="0" i="0" dirty="0">
+                <a:solidFill>
+                  <a:schemeClr val="bg1"/>
+                </a:solidFill>
+                <a:effectLst/>
+                <a:latin typeface="Arial" panose="020B0604020202020204" pitchFamily="34" charset="0"/>
+              </a:rPr>
+              <a:t>(A Latin phrase meaning “according to the value.”). Ad Valorem applies to other factors</a:t>
+            </a:r>
+            <a:br>
+              <a:rPr lang="en-US" sz="1800" dirty="0">
+                <a:solidFill>
+                  <a:schemeClr val="bg1"/>
+                </a:solidFill>
+              </a:rPr>
+            </a:br>
+            <a:r>
+              <a:rPr lang="en-US" sz="1800" b="0" i="0" dirty="0">
+                <a:solidFill>
+                  <a:schemeClr val="bg1"/>
+                </a:solidFill>
+                <a:effectLst/>
+                <a:latin typeface="Arial" panose="020B0604020202020204" pitchFamily="34" charset="0"/>
+              </a:rPr>
+              <a:t>such as alcohol %.</a:t>
             </a:r>
           </a:p>
         </p:txBody>
@@ -6123,7 +6606,7 @@
           <p:nvPr/>
         </p:nvPicPr>
         <p:blipFill>
-          <a:blip r:embed="rId2">
+          <a:blip r:embed="rId3">
             <a:extLst>
               <a:ext uri="{28A0092B-C50C-407E-A947-70E740481C1C}">
                 <a14:useLocalDpi xmlns:a14="http://schemas.microsoft.com/office/drawing/2010/main" val="0"/>
@@ -6225,8 +6708,8 @@
         </p:nvSpPr>
         <p:spPr>
           <a:xfrm>
-            <a:off x="0" y="1972789"/>
-            <a:ext cx="5077963" cy="4801314"/>
+            <a:off x="98548" y="3244334"/>
+            <a:ext cx="4893329" cy="646331"/>
           </a:xfrm>
           <a:prstGeom prst="rect">
             <a:avLst/>
@@ -6238,16 +6721,6 @@
             <a:spAutoFit/>
           </a:bodyPr>
           <a:lstStyle/>
-          <a:p>
-            <a:r>
-              <a:rPr lang="en-US" dirty="0">
-                <a:solidFill>
-                  <a:schemeClr val="bg1"/>
-                </a:solidFill>
-              </a:rPr>
-              <a:t>The population of Alaska is greater than Washington D.C. (District of Columbia), Vermont, and Wyoming respectively. If you were to rank Kansas by its bordering states according to the 2020 census data, the rankings would go:</a:t>
-            </a:r>
-          </a:p>
           <a:p>
             <a:endParaRPr lang="en-US" dirty="0">
               <a:solidFill>
@@ -6256,32 +6729,12 @@
             </a:endParaRPr>
           </a:p>
           <a:p>
-            <a:r>
-              <a:rPr lang="en-US" dirty="0">
-                <a:solidFill>
-                  <a:schemeClr val="bg1"/>
-                </a:solidFill>
-              </a:rPr>
-              <a:t>Missouri first with a population of 6,154,913, Colorado with a population of 5,773,714, Oklahoma with a population of 3,959,353, Kansas with a population of 2,937,880 then, Nebraska with a population of 1,961,504, in that order. </a:t>
-            </a:r>
-          </a:p>
-          <a:p>
             <a:endParaRPr lang="en-US" dirty="0">
               <a:solidFill>
                 <a:schemeClr val="bg1"/>
               </a:solidFill>
             </a:endParaRPr>
           </a:p>
-          <a:p>
-            <a:r>
-              <a:rPr lang="en-US" dirty="0">
-                <a:solidFill>
-                  <a:schemeClr val="bg1"/>
-                </a:solidFill>
-              </a:rPr>
-              <a:t>Every state within the Top 10 of population size is touching a body of water: California, Texas, Florida, New York, Pennsylvania, Illinois, Ohio, Georgia, North Carolina, and Michigan all touch a major body of water.</a:t>
-            </a:r>
-          </a:p>
         </p:txBody>
       </p:sp>
       <p:sp>
@@ -6299,7 +6752,7 @@
         <p:spPr>
           <a:xfrm>
             <a:off x="-74646" y="267163"/>
-            <a:ext cx="4749281" cy="1323439"/>
+            <a:ext cx="4893329" cy="1323439"/>
           </a:xfrm>
           <a:prstGeom prst="rect">
             <a:avLst/>
@@ -6319,7 +6772,7 @@
                   <a:schemeClr val="bg1"/>
                 </a:solidFill>
               </a:rPr>
-              <a:t>Population of each State</a:t>
+              <a:t>State Population to Number of Breweries</a:t>
             </a:r>
           </a:p>
         </p:txBody>
@@ -6338,7 +6791,7 @@
         </p:nvSpPr>
         <p:spPr>
           <a:xfrm>
-            <a:off x="-74646" y="1742740"/>
+            <a:off x="98548" y="1994667"/>
             <a:ext cx="4609321" cy="230049"/>
           </a:xfrm>
           <a:prstGeom prst="rect">
@@ -6375,10 +6828,10 @@
       </p:sp>
       <p:pic>
         <p:nvPicPr>
-          <p:cNvPr id="15" name="Picture 14">
-            <a:extLst>
-              <a:ext uri="{FF2B5EF4-FFF2-40B4-BE49-F238E27FC236}">
-                <a16:creationId xmlns:a16="http://schemas.microsoft.com/office/drawing/2014/main" id="{8D185CBE-8688-22F1-C2CD-2E5A1B56DA20}"/>
+          <p:cNvPr id="3" name="Picture 2">
+            <a:extLst>
+              <a:ext uri="{FF2B5EF4-FFF2-40B4-BE49-F238E27FC236}">
+                <a16:creationId xmlns:a16="http://schemas.microsoft.com/office/drawing/2014/main" id="{FD40A443-5ACD-B571-01D7-D9D285DE3BD7}"/>
               </a:ext>
             </a:extLst>
           </p:cNvPr>
@@ -6388,143 +6841,108 @@
           <p:nvPr/>
         </p:nvPicPr>
         <p:blipFill>
-          <a:blip r:embed="rId3"/>
+          <a:blip r:embed="rId4"/>
           <a:stretch>
             <a:fillRect/>
           </a:stretch>
         </p:blipFill>
         <p:spPr>
           <a:xfrm>
-            <a:off x="5679442" y="681751"/>
-            <a:ext cx="2038635" cy="5125165"/>
+            <a:off x="5476277" y="1502848"/>
+            <a:ext cx="6767944" cy="4047231"/>
           </a:xfrm>
           <a:prstGeom prst="rect">
             <a:avLst/>
           </a:prstGeom>
         </p:spPr>
       </p:pic>
-      <p:pic>
-        <p:nvPicPr>
-          <p:cNvPr id="21" name="Picture 20">
-            <a:extLst>
-              <a:ext uri="{FF2B5EF4-FFF2-40B4-BE49-F238E27FC236}">
-                <a16:creationId xmlns:a16="http://schemas.microsoft.com/office/drawing/2014/main" id="{537E4AFE-35EB-9ABB-8D31-C6CDB9A551E2}"/>
-              </a:ext>
-            </a:extLst>
-          </p:cNvPr>
-          <p:cNvPicPr>
-            <a:picLocks noChangeAspect="1"/>
-          </p:cNvPicPr>
+      <p:sp>
+        <p:nvSpPr>
+          <p:cNvPr id="5" name="TextBox 4">
+            <a:extLst>
+              <a:ext uri="{FF2B5EF4-FFF2-40B4-BE49-F238E27FC236}">
+                <a16:creationId xmlns:a16="http://schemas.microsoft.com/office/drawing/2014/main" id="{D7C55A88-DC53-0489-F615-6AAC739E6087}"/>
+              </a:ext>
+            </a:extLst>
+          </p:cNvPr>
+          <p:cNvSpPr txBox="1"/>
           <p:nvPr/>
-        </p:nvPicPr>
-        <p:blipFill rotWithShape="1">
-          <a:blip r:embed="rId4"/>
-          <a:srcRect t="13381"/>
-          <a:stretch/>
-        </p:blipFill>
-        <p:spPr>
-          <a:xfrm>
-            <a:off x="7791704" y="689067"/>
-            <a:ext cx="2019582" cy="297056"/>
+        </p:nvSpPr>
+        <p:spPr>
+          <a:xfrm>
+            <a:off x="1" y="2749313"/>
+            <a:ext cx="5201728" cy="2800767"/>
           </a:xfrm>
           <a:prstGeom prst="rect">
             <a:avLst/>
           </a:prstGeom>
-        </p:spPr>
-      </p:pic>
-      <p:pic>
-        <p:nvPicPr>
-          <p:cNvPr id="23" name="Picture 22">
-            <a:extLst>
-              <a:ext uri="{FF2B5EF4-FFF2-40B4-BE49-F238E27FC236}">
-                <a16:creationId xmlns:a16="http://schemas.microsoft.com/office/drawing/2014/main" id="{4D8DC0D2-B4C2-F3B5-6225-94CC5C3783C8}"/>
-              </a:ext>
-            </a:extLst>
-          </p:cNvPr>
-          <p:cNvPicPr>
-            <a:picLocks noChangeAspect="1"/>
-          </p:cNvPicPr>
-          <p:nvPr/>
-        </p:nvPicPr>
-        <p:blipFill rotWithShape="1">
-          <a:blip r:embed="rId4"/>
-          <a:srcRect t="13381"/>
-          <a:stretch/>
-        </p:blipFill>
-        <p:spPr>
-          <a:xfrm>
-            <a:off x="10106291" y="681751"/>
-            <a:ext cx="2019582" cy="297056"/>
-          </a:xfrm>
-          <a:prstGeom prst="rect">
-            <a:avLst/>
-          </a:prstGeom>
-        </p:spPr>
-      </p:pic>
-      <p:pic>
-        <p:nvPicPr>
-          <p:cNvPr id="27" name="Picture 26">
-            <a:extLst>
-              <a:ext uri="{FF2B5EF4-FFF2-40B4-BE49-F238E27FC236}">
-                <a16:creationId xmlns:a16="http://schemas.microsoft.com/office/drawing/2014/main" id="{18CE2E18-CB8E-B979-9CC2-650F30EE0CC4}"/>
-              </a:ext>
-            </a:extLst>
-          </p:cNvPr>
-          <p:cNvPicPr>
-            <a:picLocks noChangeAspect="1"/>
-          </p:cNvPicPr>
-          <p:nvPr/>
-        </p:nvPicPr>
-        <p:blipFill>
-          <a:blip r:embed="rId5"/>
-          <a:stretch>
-            <a:fillRect/>
-          </a:stretch>
-        </p:blipFill>
-        <p:spPr>
-          <a:xfrm>
-            <a:off x="7872678" y="978807"/>
-            <a:ext cx="1857634" cy="4877481"/>
-          </a:xfrm>
-          <a:prstGeom prst="rect">
-            <a:avLst/>
-          </a:prstGeom>
-        </p:spPr>
-      </p:pic>
-      <p:pic>
-        <p:nvPicPr>
-          <p:cNvPr id="31" name="Picture 30">
-            <a:extLst>
-              <a:ext uri="{FF2B5EF4-FFF2-40B4-BE49-F238E27FC236}">
-                <a16:creationId xmlns:a16="http://schemas.microsoft.com/office/drawing/2014/main" id="{D2E6C560-579D-7BB7-13AE-69C1C0CB7FE5}"/>
-              </a:ext>
-            </a:extLst>
-          </p:cNvPr>
-          <p:cNvPicPr>
-            <a:picLocks noChangeAspect="1"/>
-          </p:cNvPicPr>
-          <p:nvPr/>
-        </p:nvPicPr>
-        <p:blipFill>
-          <a:blip r:embed="rId6"/>
-          <a:stretch>
-            <a:fillRect/>
-          </a:stretch>
-        </p:blipFill>
-        <p:spPr>
-          <a:xfrm>
-            <a:off x="10022978" y="958014"/>
-            <a:ext cx="2133898" cy="4848902"/>
-          </a:xfrm>
-          <a:prstGeom prst="rect">
-            <a:avLst/>
-          </a:prstGeom>
-        </p:spPr>
-      </p:pic>
+          <a:noFill/>
+        </p:spPr>
+        <p:txBody>
+          <a:bodyPr wrap="square" rtlCol="0">
+            <a:spAutoFit/>
+          </a:bodyPr>
+          <a:lstStyle/>
+          <a:p>
+            <a:r>
+              <a:rPr lang="en-US" sz="1600" b="0" i="0" dirty="0">
+                <a:solidFill>
+                  <a:schemeClr val="bg1"/>
+                </a:solidFill>
+                <a:effectLst/>
+                <a:latin typeface="Arial" panose="020B0604020202020204" pitchFamily="34" charset="0"/>
+              </a:rPr>
+              <a:t>The Top 10 most populated states are all located by a major body of water. Of those 10 only 4 have a population to brewery ratio over 10,000:1.</a:t>
+            </a:r>
+          </a:p>
+          <a:p>
+            <a:endParaRPr lang="en-US" sz="1600" b="0" i="0" dirty="0">
+              <a:solidFill>
+                <a:schemeClr val="bg1"/>
+              </a:solidFill>
+              <a:effectLst/>
+              <a:latin typeface="Arial" panose="020B0604020202020204" pitchFamily="34" charset="0"/>
+            </a:endParaRPr>
+          </a:p>
+          <a:p>
+            <a:r>
+              <a:rPr lang="en-US" sz="1600" b="0" i="0" dirty="0">
+                <a:solidFill>
+                  <a:schemeClr val="bg1"/>
+                </a:solidFill>
+                <a:effectLst/>
+                <a:latin typeface="Arial" panose="020B0604020202020204" pitchFamily="34" charset="0"/>
+              </a:rPr>
+              <a:t>The State with highest population to brewery ratio is Wyoming with a ratio around 32,835 citizens for every  1 brewery. </a:t>
+            </a:r>
+          </a:p>
+          <a:p>
+            <a:endParaRPr lang="en-US" sz="1600" b="0" i="0" dirty="0">
+              <a:solidFill>
+                <a:schemeClr val="bg1"/>
+              </a:solidFill>
+              <a:effectLst/>
+              <a:latin typeface="Arial" panose="020B0604020202020204" pitchFamily="34" charset="0"/>
+            </a:endParaRPr>
+          </a:p>
+          <a:p>
+            <a:r>
+              <a:rPr lang="en-US" sz="1600" b="0" i="0" dirty="0">
+                <a:solidFill>
+                  <a:schemeClr val="bg1"/>
+                </a:solidFill>
+                <a:effectLst/>
+                <a:latin typeface="Arial" panose="020B0604020202020204" pitchFamily="34" charset="0"/>
+              </a:rPr>
+              <a:t>The State with the Lowest population to brewery ratio is Alabama with a ratio around 1,279 citizens for every 1 brewery.</a:t>
+            </a:r>
+          </a:p>
+        </p:txBody>
+      </p:sp>
     </p:spTree>
     <p:extLst>
       <p:ext uri="{BB962C8B-B14F-4D97-AF65-F5344CB8AC3E}">
-        <p14:creationId xmlns:p14="http://schemas.microsoft.com/office/powerpoint/2010/main" val="3416004155"/>
+        <p14:creationId xmlns:p14="http://schemas.microsoft.com/office/powerpoint/2010/main" val="2644156466"/>
       </p:ext>
     </p:extLst>
   </p:cSld>
@@ -6705,7 +7123,7 @@
                   <a:schemeClr val="bg1"/>
                 </a:solidFill>
               </a:rPr>
-              <a:t>California is an outlier with 912 Breweries to the population when we remove it the r value becomes about .50</a:t>
+              <a:t>California is an outlier with 904 Breweries to the population when we remove it the r value becomes about .50</a:t>
             </a:r>
           </a:p>
           <a:p>
@@ -6739,7 +7157,7 @@
         <p:spPr>
           <a:xfrm>
             <a:off x="-74646" y="267163"/>
-            <a:ext cx="4749281" cy="1938992"/>
+            <a:ext cx="5000329" cy="1323439"/>
           </a:xfrm>
           <a:prstGeom prst="rect">
             <a:avLst/>
@@ -6759,7 +7177,7 @@
                   <a:schemeClr val="bg1"/>
                 </a:solidFill>
               </a:rPr>
-              <a:t>State Population to Number of Breweries</a:t>
+              <a:t>Population to Breweries Correlation</a:t>
             </a:r>
           </a:p>
         </p:txBody>
@@ -6835,8 +7253,8 @@
         </p:blipFill>
         <p:spPr>
           <a:xfrm>
-            <a:off x="5165071" y="77364"/>
-            <a:ext cx="4188716" cy="3659200"/>
+            <a:off x="6983965" y="0"/>
+            <a:ext cx="4016914" cy="3509117"/>
           </a:xfrm>
           <a:prstGeom prst="rect">
             <a:avLst/>
@@ -6865,8 +7283,8 @@
         </p:blipFill>
         <p:spPr>
           <a:xfrm>
-            <a:off x="7804629" y="3101282"/>
-            <a:ext cx="4385091" cy="3679354"/>
+            <a:off x="6983965" y="3487569"/>
+            <a:ext cx="4016914" cy="3370431"/>
           </a:xfrm>
           <a:prstGeom prst="rect">
             <a:avLst/>
@@ -6876,7 +7294,7 @@
     </p:spTree>
     <p:extLst>
       <p:ext uri="{BB962C8B-B14F-4D97-AF65-F5344CB8AC3E}">
-        <p14:creationId xmlns:p14="http://schemas.microsoft.com/office/powerpoint/2010/main" val="2644156466"/>
+        <p14:creationId xmlns:p14="http://schemas.microsoft.com/office/powerpoint/2010/main" val="2189297899"/>
       </p:ext>
     </p:extLst>
   </p:cSld>

</xml_diff>